<commit_message>
Step 1, fixing comma error
</commit_message>
<xml_diff>
--- a/CLV_Incidents.pptx
+++ b/CLV_Incidents.pptx
@@ -8,18 +8,19 @@
     <p:sldId id="256" r:id="rId2"/>
     <p:sldId id="258" r:id="rId3"/>
     <p:sldId id="259" r:id="rId4"/>
-    <p:sldId id="257" r:id="rId5"/>
-    <p:sldId id="261" r:id="rId6"/>
-    <p:sldId id="262" r:id="rId7"/>
-    <p:sldId id="267" r:id="rId8"/>
-    <p:sldId id="273" r:id="rId9"/>
-    <p:sldId id="263" r:id="rId10"/>
-    <p:sldId id="272" r:id="rId11"/>
-    <p:sldId id="270" r:id="rId12"/>
-    <p:sldId id="266" r:id="rId13"/>
-    <p:sldId id="268" r:id="rId14"/>
-    <p:sldId id="264" r:id="rId15"/>
-    <p:sldId id="265" r:id="rId16"/>
+    <p:sldId id="274" r:id="rId5"/>
+    <p:sldId id="257" r:id="rId6"/>
+    <p:sldId id="261" r:id="rId7"/>
+    <p:sldId id="262" r:id="rId8"/>
+    <p:sldId id="267" r:id="rId9"/>
+    <p:sldId id="273" r:id="rId10"/>
+    <p:sldId id="263" r:id="rId11"/>
+    <p:sldId id="272" r:id="rId12"/>
+    <p:sldId id="270" r:id="rId13"/>
+    <p:sldId id="266" r:id="rId14"/>
+    <p:sldId id="268" r:id="rId15"/>
+    <p:sldId id="264" r:id="rId16"/>
+    <p:sldId id="265" r:id="rId17"/>
   </p:sldIdLst>
   <p:sldSz cx="12192000" cy="6858000"/>
   <p:notesSz cx="6858000" cy="9144000"/>
@@ -6044,6 +6045,133 @@
           <p:cNvPr id="4" name="Content Placeholder 2">
             <a:extLst>
               <a:ext uri="{FF2B5EF4-FFF2-40B4-BE49-F238E27FC236}">
+                <a16:creationId xmlns:a16="http://schemas.microsoft.com/office/drawing/2014/main" id="{7AE6D5EE-88CC-4A5B-8D4A-73BE2E3576F2}"/>
+              </a:ext>
+            </a:extLst>
+          </p:cNvPr>
+          <p:cNvSpPr>
+            <a:spLocks noGrp="1"/>
+          </p:cNvSpPr>
+          <p:nvPr>
+            <p:ph idx="1"/>
+          </p:nvPr>
+        </p:nvSpPr>
+        <p:spPr>
+          <a:xfrm>
+            <a:off x="677334" y="1464859"/>
+            <a:ext cx="8596668" cy="3880773"/>
+          </a:xfrm>
+        </p:spPr>
+        <p:txBody>
+          <a:bodyPr/>
+          <a:lstStyle/>
+          <a:p>
+            <a:r>
+              <a:rPr lang="en-US" dirty="0"/>
+              <a:t>Types of Responses</a:t>
+            </a:r>
+          </a:p>
+        </p:txBody>
+      </p:sp>
+      <p:pic>
+        <p:nvPicPr>
+          <p:cNvPr id="10" name="Picture 9">
+            <a:extLst>
+              <a:ext uri="{FF2B5EF4-FFF2-40B4-BE49-F238E27FC236}">
+                <a16:creationId xmlns:a16="http://schemas.microsoft.com/office/drawing/2014/main" id="{C14FF669-EF75-47CF-ACC8-7AA656377B14}"/>
+              </a:ext>
+            </a:extLst>
+          </p:cNvPr>
+          <p:cNvPicPr>
+            <a:picLocks noChangeAspect="1"/>
+          </p:cNvPicPr>
+          <p:nvPr/>
+        </p:nvPicPr>
+        <p:blipFill>
+          <a:blip r:embed="rId2">
+            <a:extLst>
+              <a:ext uri="{28A0092B-C50C-407E-A947-70E740481C1C}">
+                <a14:useLocalDpi xmlns:a14="http://schemas.microsoft.com/office/drawing/2010/main" val="0"/>
+              </a:ext>
+            </a:extLst>
+          </a:blip>
+          <a:stretch>
+            <a:fillRect/>
+          </a:stretch>
+        </p:blipFill>
+        <p:spPr>
+          <a:xfrm>
+            <a:off x="3335503" y="1704974"/>
+            <a:ext cx="5520995" cy="5000625"/>
+          </a:xfrm>
+          <a:prstGeom prst="rect">
+            <a:avLst/>
+          </a:prstGeom>
+        </p:spPr>
+      </p:pic>
+    </p:spTree>
+    <p:extLst>
+      <p:ext uri="{BB962C8B-B14F-4D97-AF65-F5344CB8AC3E}">
+        <p14:creationId xmlns:p14="http://schemas.microsoft.com/office/powerpoint/2010/main" val="796665630"/>
+      </p:ext>
+    </p:extLst>
+  </p:cSld>
+  <p:clrMapOvr>
+    <a:masterClrMapping/>
+  </p:clrMapOvr>
+</p:sld>
+</file>
+
+<file path=ppt/slides/slide11.xml><?xml version="1.0" encoding="utf-8"?>
+<p:sld xmlns:a="http://schemas.openxmlformats.org/drawingml/2006/main" xmlns:r="http://schemas.openxmlformats.org/officeDocument/2006/relationships" xmlns:p="http://schemas.openxmlformats.org/presentationml/2006/main">
+  <p:cSld>
+    <p:spTree>
+      <p:nvGrpSpPr>
+        <p:cNvPr id="1" name=""/>
+        <p:cNvGrpSpPr/>
+        <p:nvPr/>
+      </p:nvGrpSpPr>
+      <p:grpSpPr>
+        <a:xfrm>
+          <a:off x="0" y="0"/>
+          <a:ext cx="0" cy="0"/>
+          <a:chOff x="0" y="0"/>
+          <a:chExt cx="0" cy="0"/>
+        </a:xfrm>
+      </p:grpSpPr>
+      <p:sp>
+        <p:nvSpPr>
+          <p:cNvPr id="2" name="Title 1">
+            <a:extLst>
+              <a:ext uri="{FF2B5EF4-FFF2-40B4-BE49-F238E27FC236}">
+                <a16:creationId xmlns:a16="http://schemas.microsoft.com/office/drawing/2014/main" id="{8697AD0D-7CB4-4EB2-AB85-565C07FB0E0B}"/>
+              </a:ext>
+            </a:extLst>
+          </p:cNvPr>
+          <p:cNvSpPr>
+            <a:spLocks noGrp="1"/>
+          </p:cNvSpPr>
+          <p:nvPr>
+            <p:ph type="title"/>
+          </p:nvPr>
+        </p:nvSpPr>
+        <p:spPr/>
+        <p:txBody>
+          <a:bodyPr/>
+          <a:lstStyle/>
+          <a:p>
+            <a:r>
+              <a:rPr lang="en-US" dirty="0"/>
+              <a:t>Telling the Story</a:t>
+            </a:r>
+          </a:p>
+        </p:txBody>
+      </p:sp>
+      <p:sp>
+        <p:nvSpPr>
+          <p:cNvPr id="4" name="Content Placeholder 2">
+            <a:extLst>
+              <a:ext uri="{FF2B5EF4-FFF2-40B4-BE49-F238E27FC236}">
                 <a16:creationId xmlns:a16="http://schemas.microsoft.com/office/drawing/2014/main" id="{AC3FA889-3A10-40EC-BB2D-CBA8BC42ED67}"/>
               </a:ext>
             </a:extLst>
@@ -6115,7 +6243,7 @@
 </p:sld>
 </file>
 
-<file path=ppt/slides/slide11.xml><?xml version="1.0" encoding="utf-8"?>
+<file path=ppt/slides/slide12.xml><?xml version="1.0" encoding="utf-8"?>
 <p:sld xmlns:a="http://schemas.openxmlformats.org/drawingml/2006/main" xmlns:r="http://schemas.openxmlformats.org/officeDocument/2006/relationships" xmlns:p="http://schemas.openxmlformats.org/presentationml/2006/main">
   <p:cSld>
     <p:spTree>
@@ -6373,7 +6501,7 @@
 </p:sld>
 </file>
 
-<file path=ppt/slides/slide12.xml><?xml version="1.0" encoding="utf-8"?>
+<file path=ppt/slides/slide13.xml><?xml version="1.0" encoding="utf-8"?>
 <p:sld xmlns:a="http://schemas.openxmlformats.org/drawingml/2006/main" xmlns:r="http://schemas.openxmlformats.org/officeDocument/2006/relationships" xmlns:p="http://schemas.openxmlformats.org/presentationml/2006/main">
   <p:cSld>
     <p:spTree>
@@ -6494,7 +6622,7 @@
 </p:sld>
 </file>
 
-<file path=ppt/slides/slide13.xml><?xml version="1.0" encoding="utf-8"?>
+<file path=ppt/slides/slide14.xml><?xml version="1.0" encoding="utf-8"?>
 <p:sld xmlns:a="http://schemas.openxmlformats.org/drawingml/2006/main" xmlns:r="http://schemas.openxmlformats.org/officeDocument/2006/relationships" xmlns:p="http://schemas.openxmlformats.org/presentationml/2006/main">
   <p:cSld>
     <p:spTree>
@@ -6645,7 +6773,7 @@
 </p:sld>
 </file>
 
-<file path=ppt/slides/slide14.xml><?xml version="1.0" encoding="utf-8"?>
+<file path=ppt/slides/slide15.xml><?xml version="1.0" encoding="utf-8"?>
 <p:sld xmlns:a="http://schemas.openxmlformats.org/drawingml/2006/main" xmlns:r="http://schemas.openxmlformats.org/officeDocument/2006/relationships" xmlns:p="http://schemas.openxmlformats.org/presentationml/2006/main">
   <p:cSld>
     <p:spTree>
@@ -6739,7 +6867,7 @@
 </p:sld>
 </file>
 
-<file path=ppt/slides/slide15.xml><?xml version="1.0" encoding="utf-8"?>
+<file path=ppt/slides/slide16.xml><?xml version="1.0" encoding="utf-8"?>
 <p:sld xmlns:a="http://schemas.openxmlformats.org/drawingml/2006/main" xmlns:r="http://schemas.openxmlformats.org/officeDocument/2006/relationships" xmlns:p="http://schemas.openxmlformats.org/presentationml/2006/main">
   <p:cSld>
     <p:spTree>
@@ -6953,6 +7081,12 @@
           <a:p>
             <a:r>
               <a:rPr lang="en-US" dirty="0"/>
+              <a:t>Our Hypothesis</a:t>
+            </a:r>
+          </a:p>
+          <a:p>
+            <a:r>
+              <a:rPr lang="en-US" dirty="0"/>
               <a:t>Retrieving, Assembling, and Cleaning Data</a:t>
             </a:r>
           </a:p>
@@ -7082,6 +7216,20 @@
             </a:r>
           </a:p>
           <a:p>
+            <a:pPr lvl="1"/>
+            <a:r>
+              <a:rPr lang="en-US" sz="1400" dirty="0"/>
+              <a:t>Kaggle</a:t>
+            </a:r>
+          </a:p>
+          <a:p>
+            <a:pPr lvl="1"/>
+            <a:r>
+              <a:rPr lang="en-US" sz="1400" dirty="0"/>
+              <a:t>Direct from Source</a:t>
+            </a:r>
+          </a:p>
+          <a:p>
             <a:r>
               <a:rPr lang="en-US" dirty="0"/>
               <a:t>Project Selection Criteria</a:t>
@@ -7090,7 +7238,7 @@
           <a:p>
             <a:r>
               <a:rPr lang="en-US" dirty="0"/>
-              <a:t>Initial Analysis to Develop a Hypothesis </a:t>
+              <a:t>Initial Analysis -&gt; Validate Data Quality/Quantity -&gt; Develop a Hypothesis </a:t>
             </a:r>
           </a:p>
         </p:txBody>
@@ -7109,6 +7257,116 @@
 </file>
 
 <file path=ppt/slides/slide4.xml><?xml version="1.0" encoding="utf-8"?>
+<p:sld xmlns:a="http://schemas.openxmlformats.org/drawingml/2006/main" xmlns:r="http://schemas.openxmlformats.org/officeDocument/2006/relationships" xmlns:p="http://schemas.openxmlformats.org/presentationml/2006/main">
+  <p:cSld>
+    <p:spTree>
+      <p:nvGrpSpPr>
+        <p:cNvPr id="1" name=""/>
+        <p:cNvGrpSpPr/>
+        <p:nvPr/>
+      </p:nvGrpSpPr>
+      <p:grpSpPr>
+        <a:xfrm>
+          <a:off x="0" y="0"/>
+          <a:ext cx="0" cy="0"/>
+          <a:chOff x="0" y="0"/>
+          <a:chExt cx="0" cy="0"/>
+        </a:xfrm>
+      </p:grpSpPr>
+      <p:sp>
+        <p:nvSpPr>
+          <p:cNvPr id="2" name="Title 1">
+            <a:extLst>
+              <a:ext uri="{FF2B5EF4-FFF2-40B4-BE49-F238E27FC236}">
+                <a16:creationId xmlns:a16="http://schemas.microsoft.com/office/drawing/2014/main" id="{0693BC7B-B37F-4E79-8731-1C904388A06E}"/>
+              </a:ext>
+            </a:extLst>
+          </p:cNvPr>
+          <p:cNvSpPr>
+            <a:spLocks noGrp="1"/>
+          </p:cNvSpPr>
+          <p:nvPr>
+            <p:ph type="title"/>
+          </p:nvPr>
+        </p:nvSpPr>
+        <p:spPr/>
+        <p:txBody>
+          <a:bodyPr/>
+          <a:lstStyle/>
+          <a:p>
+            <a:r>
+              <a:rPr lang="en-US" dirty="0"/>
+              <a:t>Our Hypothesis</a:t>
+            </a:r>
+          </a:p>
+        </p:txBody>
+      </p:sp>
+      <p:sp>
+        <p:nvSpPr>
+          <p:cNvPr id="3" name="Content Placeholder 2">
+            <a:extLst>
+              <a:ext uri="{FF2B5EF4-FFF2-40B4-BE49-F238E27FC236}">
+                <a16:creationId xmlns:a16="http://schemas.microsoft.com/office/drawing/2014/main" id="{8C9E1371-D2E2-45D4-AD73-E0BBDEDEE336}"/>
+              </a:ext>
+            </a:extLst>
+          </p:cNvPr>
+          <p:cNvSpPr>
+            <a:spLocks noGrp="1"/>
+          </p:cNvSpPr>
+          <p:nvPr>
+            <p:ph idx="1"/>
+          </p:nvPr>
+        </p:nvSpPr>
+        <p:spPr/>
+        <p:txBody>
+          <a:bodyPr/>
+          <a:lstStyle/>
+          <a:p>
+            <a:r>
+              <a:rPr lang="en-US" dirty="0"/>
+              <a:t>Response times for the Las Vegas Fire Department (LVFD) have improved (were reduced) over 2011 to 2018.  </a:t>
+            </a:r>
+          </a:p>
+          <a:p>
+            <a:pPr lvl="1"/>
+            <a:r>
+              <a:rPr lang="en-US" dirty="0"/>
+              <a:t>Continuous Improvement?</a:t>
+            </a:r>
+          </a:p>
+          <a:p>
+            <a:pPr lvl="1"/>
+            <a:r>
+              <a:rPr lang="en-US" dirty="0"/>
+              <a:t>Department Sizing?</a:t>
+            </a:r>
+          </a:p>
+          <a:p>
+            <a:pPr lvl="1"/>
+            <a:endParaRPr lang="en-US" dirty="0"/>
+          </a:p>
+          <a:p>
+            <a:pPr marL="0" indent="0">
+              <a:buNone/>
+            </a:pPr>
+            <a:endParaRPr lang="en-US" dirty="0"/>
+          </a:p>
+        </p:txBody>
+      </p:sp>
+    </p:spTree>
+    <p:extLst>
+      <p:ext uri="{BB962C8B-B14F-4D97-AF65-F5344CB8AC3E}">
+        <p14:creationId xmlns:p14="http://schemas.microsoft.com/office/powerpoint/2010/main" val="288090298"/>
+      </p:ext>
+    </p:extLst>
+  </p:cSld>
+  <p:clrMapOvr>
+    <a:masterClrMapping/>
+  </p:clrMapOvr>
+</p:sld>
+</file>
+
+<file path=ppt/slides/slide5.xml><?xml version="1.0" encoding="utf-8"?>
 <p:sld xmlns:a="http://schemas.openxmlformats.org/drawingml/2006/main" xmlns:r="http://schemas.openxmlformats.org/officeDocument/2006/relationships" xmlns:p="http://schemas.openxmlformats.org/presentationml/2006/main">
   <p:cSld>
     <p:spTree>
@@ -8148,7 +8406,11 @@
           <a:lstStyle/>
           <a:p>
             <a:r>
-              <a:rPr lang="en-US" sz="1100" i="1" dirty="0"/>
+              <a:rPr lang="en-US" sz="1100" i="1" dirty="0">
+                <a:solidFill>
+                  <a:srgbClr val="FF0000"/>
+                </a:solidFill>
+              </a:rPr>
               <a:t>&gt; 100Mb max on GitHub</a:t>
             </a:r>
           </a:p>
@@ -8184,173 +8446,116 @@
           </a:prstGeom>
         </p:spPr>
       </p:pic>
+      <p:sp>
+        <p:nvSpPr>
+          <p:cNvPr id="24" name="TextBox 23">
+            <a:extLst>
+              <a:ext uri="{FF2B5EF4-FFF2-40B4-BE49-F238E27FC236}">
+                <a16:creationId xmlns:a16="http://schemas.microsoft.com/office/drawing/2014/main" id="{35453669-6211-4138-8D67-F3C0FD31DF59}"/>
+              </a:ext>
+            </a:extLst>
+          </p:cNvPr>
+          <p:cNvSpPr txBox="1"/>
+          <p:nvPr/>
+        </p:nvSpPr>
+        <p:spPr>
+          <a:xfrm>
+            <a:off x="8028241" y="2794431"/>
+            <a:ext cx="2989293" cy="461665"/>
+          </a:xfrm>
+          <a:prstGeom prst="rect">
+            <a:avLst/>
+          </a:prstGeom>
+          <a:noFill/>
+        </p:spPr>
+        <p:txBody>
+          <a:bodyPr wrap="square" rtlCol="0">
+            <a:spAutoFit/>
+          </a:bodyPr>
+          <a:lstStyle/>
+          <a:p>
+            <a:pPr marL="171450" indent="-171450">
+              <a:buFontTx/>
+              <a:buChar char="-"/>
+            </a:pPr>
+            <a:r>
+              <a:rPr lang="en-US" sz="1200" i="1" dirty="0">
+                <a:solidFill>
+                  <a:schemeClr val="bg1">
+                    <a:lumMod val="50000"/>
+                  </a:schemeClr>
+                </a:solidFill>
+              </a:rPr>
+              <a:t>Las Vegas</a:t>
+            </a:r>
+          </a:p>
+          <a:p>
+            <a:pPr marL="171450" indent="-171450">
+              <a:buFontTx/>
+              <a:buChar char="-"/>
+            </a:pPr>
+            <a:r>
+              <a:rPr lang="en-US" sz="1200" i="1" dirty="0">
+                <a:solidFill>
+                  <a:schemeClr val="bg1">
+                    <a:lumMod val="50000"/>
+                  </a:schemeClr>
+                </a:solidFill>
+              </a:rPr>
+              <a:t>Surrounding Counties</a:t>
+            </a:r>
+          </a:p>
+        </p:txBody>
+      </p:sp>
+      <p:sp>
+        <p:nvSpPr>
+          <p:cNvPr id="25" name="TextBox 24">
+            <a:extLst>
+              <a:ext uri="{FF2B5EF4-FFF2-40B4-BE49-F238E27FC236}">
+                <a16:creationId xmlns:a16="http://schemas.microsoft.com/office/drawing/2014/main" id="{53CA11E1-3D51-46A5-AA40-7BE22F56442E}"/>
+              </a:ext>
+            </a:extLst>
+          </p:cNvPr>
+          <p:cNvSpPr txBox="1"/>
+          <p:nvPr/>
+        </p:nvSpPr>
+        <p:spPr>
+          <a:xfrm>
+            <a:off x="2116057" y="2885288"/>
+            <a:ext cx="1541543" cy="276999"/>
+          </a:xfrm>
+          <a:prstGeom prst="rect">
+            <a:avLst/>
+          </a:prstGeom>
+          <a:noFill/>
+        </p:spPr>
+        <p:txBody>
+          <a:bodyPr wrap="square" rtlCol="0">
+            <a:spAutoFit/>
+          </a:bodyPr>
+          <a:lstStyle/>
+          <a:p>
+            <a:pPr marL="171450" indent="-171450">
+              <a:buFontTx/>
+              <a:buChar char="-"/>
+            </a:pPr>
+            <a:r>
+              <a:rPr lang="en-US" sz="1200" i="1" dirty="0">
+                <a:solidFill>
+                  <a:schemeClr val="bg1">
+                    <a:lumMod val="50000"/>
+                  </a:schemeClr>
+                </a:solidFill>
+              </a:rPr>
+              <a:t>City of Las Vegas</a:t>
+            </a:r>
+          </a:p>
+        </p:txBody>
+      </p:sp>
     </p:spTree>
     <p:extLst>
       <p:ext uri="{BB962C8B-B14F-4D97-AF65-F5344CB8AC3E}">
         <p14:creationId xmlns:p14="http://schemas.microsoft.com/office/powerpoint/2010/main" val="731326120"/>
-      </p:ext>
-    </p:extLst>
-  </p:cSld>
-  <p:clrMapOvr>
-    <a:masterClrMapping/>
-  </p:clrMapOvr>
-</p:sld>
-</file>
-
-<file path=ppt/slides/slide5.xml><?xml version="1.0" encoding="utf-8"?>
-<p:sld xmlns:a="http://schemas.openxmlformats.org/drawingml/2006/main" xmlns:r="http://schemas.openxmlformats.org/officeDocument/2006/relationships" xmlns:p="http://schemas.openxmlformats.org/presentationml/2006/main">
-  <p:cSld>
-    <p:spTree>
-      <p:nvGrpSpPr>
-        <p:cNvPr id="1" name=""/>
-        <p:cNvGrpSpPr/>
-        <p:nvPr/>
-      </p:nvGrpSpPr>
-      <p:grpSpPr>
-        <a:xfrm>
-          <a:off x="0" y="0"/>
-          <a:ext cx="0" cy="0"/>
-          <a:chOff x="0" y="0"/>
-          <a:chExt cx="0" cy="0"/>
-        </a:xfrm>
-      </p:grpSpPr>
-      <p:sp>
-        <p:nvSpPr>
-          <p:cNvPr id="2" name="Title 1">
-            <a:extLst>
-              <a:ext uri="{FF2B5EF4-FFF2-40B4-BE49-F238E27FC236}">
-                <a16:creationId xmlns:a16="http://schemas.microsoft.com/office/drawing/2014/main" id="{A18A90C7-36C4-4598-A1EE-D10A2B477FD1}"/>
-              </a:ext>
-            </a:extLst>
-          </p:cNvPr>
-          <p:cNvSpPr>
-            <a:spLocks noGrp="1"/>
-          </p:cNvSpPr>
-          <p:nvPr>
-            <p:ph type="title"/>
-          </p:nvPr>
-        </p:nvSpPr>
-        <p:spPr/>
-        <p:txBody>
-          <a:bodyPr/>
-          <a:lstStyle/>
-          <a:p>
-            <a:r>
-              <a:rPr lang="en-US" dirty="0"/>
-              <a:t>Project Scope </a:t>
-            </a:r>
-          </a:p>
-        </p:txBody>
-      </p:sp>
-      <p:sp>
-        <p:nvSpPr>
-          <p:cNvPr id="3" name="Content Placeholder 2">
-            <a:extLst>
-              <a:ext uri="{FF2B5EF4-FFF2-40B4-BE49-F238E27FC236}">
-                <a16:creationId xmlns:a16="http://schemas.microsoft.com/office/drawing/2014/main" id="{0B14241A-E4D5-4C1D-8697-E7DB2C9D9B1B}"/>
-              </a:ext>
-            </a:extLst>
-          </p:cNvPr>
-          <p:cNvSpPr>
-            <a:spLocks noGrp="1"/>
-          </p:cNvSpPr>
-          <p:nvPr>
-            <p:ph idx="1"/>
-          </p:nvPr>
-        </p:nvSpPr>
-        <p:spPr/>
-        <p:txBody>
-          <a:bodyPr>
-            <a:normAutofit lnSpcReduction="10000"/>
-          </a:bodyPr>
-          <a:lstStyle/>
-          <a:p>
-            <a:r>
-              <a:rPr lang="en-US" dirty="0"/>
-              <a:t>July 2011 – December 2018</a:t>
-            </a:r>
-          </a:p>
-          <a:p>
-            <a:r>
-              <a:rPr lang="en-US" dirty="0"/>
-              <a:t>City of Las Vegas </a:t>
-            </a:r>
-            <a:r>
-              <a:rPr lang="en-US" i="1" u="sng" dirty="0"/>
-              <a:t>only</a:t>
-            </a:r>
-          </a:p>
-          <a:p>
-            <a:endParaRPr lang="en-US" i="1" u="sng" dirty="0"/>
-          </a:p>
-          <a:p>
-            <a:endParaRPr lang="en-US" i="1" u="sng" dirty="0"/>
-          </a:p>
-          <a:p>
-            <a:pPr marL="0" indent="0">
-              <a:buNone/>
-            </a:pPr>
-            <a:r>
-              <a:rPr lang="en-US" u="sng" dirty="0"/>
-              <a:t>EXCLUSIONS:</a:t>
-            </a:r>
-          </a:p>
-          <a:p>
-            <a:r>
-              <a:rPr lang="en-US" dirty="0"/>
-              <a:t>Census Data (Correlation w/ Population)</a:t>
-            </a:r>
-          </a:p>
-          <a:p>
-            <a:pPr lvl="1"/>
-            <a:r>
-              <a:rPr lang="en-US" sz="1400" dirty="0"/>
-              <a:t>Residents (Full-Time vs. Seasonal)</a:t>
-            </a:r>
-          </a:p>
-          <a:p>
-            <a:pPr lvl="1"/>
-            <a:r>
-              <a:rPr lang="en-US" sz="1400" dirty="0"/>
-              <a:t>Tourists</a:t>
-            </a:r>
-          </a:p>
-          <a:p>
-            <a:r>
-              <a:rPr lang="en-US" dirty="0"/>
-              <a:t>Distances (Correlation w/ Distances)</a:t>
-            </a:r>
-          </a:p>
-          <a:p>
-            <a:pPr marL="457200" lvl="1" indent="0">
-              <a:buNone/>
-            </a:pPr>
-            <a:r>
-              <a:rPr lang="en-US" sz="1200" dirty="0"/>
-              <a:t>Google Distance Matrix API limits &amp; pricing:</a:t>
-            </a:r>
-          </a:p>
-          <a:p>
-            <a:pPr marL="457200" lvl="1" indent="0">
-              <a:buNone/>
-            </a:pPr>
-            <a:r>
-              <a:rPr lang="en-US" sz="1200" dirty="0">
-                <a:hlinkClick r:id="rId2"/>
-              </a:rPr>
-              <a:t>https://developers.google.com/maps/documentation/distance-matrix/overview</a:t>
-            </a:r>
-            <a:endParaRPr lang="en-US" sz="1200" dirty="0"/>
-          </a:p>
-          <a:p>
-            <a:endParaRPr lang="en-US" dirty="0"/>
-          </a:p>
-        </p:txBody>
-      </p:sp>
-    </p:spTree>
-    <p:extLst>
-      <p:ext uri="{BB962C8B-B14F-4D97-AF65-F5344CB8AC3E}">
-        <p14:creationId xmlns:p14="http://schemas.microsoft.com/office/powerpoint/2010/main" val="3483305846"/>
       </p:ext>
     </p:extLst>
   </p:cSld>
@@ -8382,6 +8587,209 @@
           <p:cNvPr id="2" name="Title 1">
             <a:extLst>
               <a:ext uri="{FF2B5EF4-FFF2-40B4-BE49-F238E27FC236}">
+                <a16:creationId xmlns:a16="http://schemas.microsoft.com/office/drawing/2014/main" id="{A18A90C7-36C4-4598-A1EE-D10A2B477FD1}"/>
+              </a:ext>
+            </a:extLst>
+          </p:cNvPr>
+          <p:cNvSpPr>
+            <a:spLocks noGrp="1"/>
+          </p:cNvSpPr>
+          <p:nvPr>
+            <p:ph type="title"/>
+          </p:nvPr>
+        </p:nvSpPr>
+        <p:spPr/>
+        <p:txBody>
+          <a:bodyPr/>
+          <a:lstStyle/>
+          <a:p>
+            <a:r>
+              <a:rPr lang="en-US" dirty="0"/>
+              <a:t>Project Scope </a:t>
+            </a:r>
+          </a:p>
+        </p:txBody>
+      </p:sp>
+      <p:sp>
+        <p:nvSpPr>
+          <p:cNvPr id="3" name="Content Placeholder 2">
+            <a:extLst>
+              <a:ext uri="{FF2B5EF4-FFF2-40B4-BE49-F238E27FC236}">
+                <a16:creationId xmlns:a16="http://schemas.microsoft.com/office/drawing/2014/main" id="{0B14241A-E4D5-4C1D-8697-E7DB2C9D9B1B}"/>
+              </a:ext>
+            </a:extLst>
+          </p:cNvPr>
+          <p:cNvSpPr>
+            <a:spLocks noGrp="1"/>
+          </p:cNvSpPr>
+          <p:nvPr>
+            <p:ph idx="1"/>
+          </p:nvPr>
+        </p:nvSpPr>
+        <p:spPr/>
+        <p:txBody>
+          <a:bodyPr>
+            <a:normAutofit fontScale="92500" lnSpcReduction="10000"/>
+          </a:bodyPr>
+          <a:lstStyle/>
+          <a:p>
+            <a:r>
+              <a:rPr lang="en-US" dirty="0"/>
+              <a:t>July 2011 – December 2018</a:t>
+            </a:r>
+          </a:p>
+          <a:p>
+            <a:r>
+              <a:rPr lang="en-US" dirty="0"/>
+              <a:t>City of Las Vegas </a:t>
+            </a:r>
+            <a:r>
+              <a:rPr lang="en-US" i="1" u="sng" dirty="0"/>
+              <a:t>only</a:t>
+            </a:r>
+          </a:p>
+          <a:p>
+            <a:endParaRPr lang="en-US" i="1" u="sng" dirty="0"/>
+          </a:p>
+          <a:p>
+            <a:pPr marL="0" indent="0">
+              <a:buNone/>
+            </a:pPr>
+            <a:r>
+              <a:rPr lang="en-US" u="sng" dirty="0"/>
+              <a:t>EXCLUSIONS:</a:t>
+            </a:r>
+          </a:p>
+          <a:p>
+            <a:r>
+              <a:rPr lang="en-US" dirty="0"/>
+              <a:t>Census Data (Correlation w/ Population)</a:t>
+            </a:r>
+          </a:p>
+          <a:p>
+            <a:pPr lvl="1"/>
+            <a:r>
+              <a:rPr lang="en-US" sz="1400" dirty="0"/>
+              <a:t>Per Capita data included; No significant variation throughout the years</a:t>
+            </a:r>
+          </a:p>
+          <a:p>
+            <a:pPr lvl="1"/>
+            <a:r>
+              <a:rPr lang="en-US" sz="1400" dirty="0"/>
+              <a:t>Residents (Full-Time vs. Seasonal)</a:t>
+            </a:r>
+          </a:p>
+          <a:p>
+            <a:pPr lvl="1"/>
+            <a:r>
+              <a:rPr lang="en-US" sz="1400" dirty="0"/>
+              <a:t>Tourists</a:t>
+            </a:r>
+          </a:p>
+          <a:p>
+            <a:r>
+              <a:rPr lang="en-US" dirty="0"/>
+              <a:t>Distances (Correlation w/ Distances)</a:t>
+            </a:r>
+          </a:p>
+          <a:p>
+            <a:pPr marL="457200" lvl="1" indent="0">
+              <a:buNone/>
+            </a:pPr>
+            <a:r>
+              <a:rPr lang="en-US" sz="1100" dirty="0"/>
+              <a:t>Google Distance Matrix API limits &amp; pricing (5.00 USD per 1000)</a:t>
+            </a:r>
+          </a:p>
+          <a:p>
+            <a:pPr marL="457200" lvl="1" indent="0">
+              <a:buNone/>
+            </a:pPr>
+            <a:r>
+              <a:rPr lang="en-US" sz="1100" dirty="0">
+                <a:hlinkClick r:id="rId2"/>
+              </a:rPr>
+              <a:t>https://developers.google.com/maps/documentation/distance-matrix/overview</a:t>
+            </a:r>
+            <a:endParaRPr lang="en-US" sz="1100" dirty="0"/>
+          </a:p>
+          <a:p>
+            <a:pPr marL="400050" lvl="1" indent="0">
+              <a:buNone/>
+            </a:pPr>
+            <a:r>
+              <a:rPr lang="en-US" sz="1100" dirty="0"/>
+              <a:t>	Haversine Formula</a:t>
+            </a:r>
+          </a:p>
+        </p:txBody>
+      </p:sp>
+      <p:pic>
+        <p:nvPicPr>
+          <p:cNvPr id="8" name="Picture 7">
+            <a:extLst>
+              <a:ext uri="{FF2B5EF4-FFF2-40B4-BE49-F238E27FC236}">
+                <a16:creationId xmlns:a16="http://schemas.microsoft.com/office/drawing/2014/main" id="{6F2BC427-6F0A-477B-928C-67EAEF7B669B}"/>
+              </a:ext>
+            </a:extLst>
+          </p:cNvPr>
+          <p:cNvPicPr>
+            <a:picLocks noChangeAspect="1"/>
+          </p:cNvPicPr>
+          <p:nvPr/>
+        </p:nvPicPr>
+        <p:blipFill>
+          <a:blip r:embed="rId3"/>
+          <a:stretch>
+            <a:fillRect/>
+          </a:stretch>
+        </p:blipFill>
+        <p:spPr>
+          <a:xfrm>
+            <a:off x="2562743" y="5691188"/>
+            <a:ext cx="1301060" cy="1102649"/>
+          </a:xfrm>
+          <a:prstGeom prst="rect">
+            <a:avLst/>
+          </a:prstGeom>
+        </p:spPr>
+      </p:pic>
+    </p:spTree>
+    <p:extLst>
+      <p:ext uri="{BB962C8B-B14F-4D97-AF65-F5344CB8AC3E}">
+        <p14:creationId xmlns:p14="http://schemas.microsoft.com/office/powerpoint/2010/main" val="3483305846"/>
+      </p:ext>
+    </p:extLst>
+  </p:cSld>
+  <p:clrMapOvr>
+    <a:masterClrMapping/>
+  </p:clrMapOvr>
+</p:sld>
+</file>
+
+<file path=ppt/slides/slide7.xml><?xml version="1.0" encoding="utf-8"?>
+<p:sld xmlns:a="http://schemas.openxmlformats.org/drawingml/2006/main" xmlns:r="http://schemas.openxmlformats.org/officeDocument/2006/relationships" xmlns:p="http://schemas.openxmlformats.org/presentationml/2006/main">
+  <p:cSld>
+    <p:spTree>
+      <p:nvGrpSpPr>
+        <p:cNvPr id="1" name=""/>
+        <p:cNvGrpSpPr/>
+        <p:nvPr/>
+      </p:nvGrpSpPr>
+      <p:grpSpPr>
+        <a:xfrm>
+          <a:off x="0" y="0"/>
+          <a:ext cx="0" cy="0"/>
+          <a:chOff x="0" y="0"/>
+          <a:chExt cx="0" cy="0"/>
+        </a:xfrm>
+      </p:grpSpPr>
+      <p:sp>
+        <p:nvSpPr>
+          <p:cNvPr id="2" name="Title 1">
+            <a:extLst>
+              <a:ext uri="{FF2B5EF4-FFF2-40B4-BE49-F238E27FC236}">
                 <a16:creationId xmlns:a16="http://schemas.microsoft.com/office/drawing/2014/main" id="{22F23641-B05C-4174-B263-621222CA1325}"/>
               </a:ext>
             </a:extLst>
@@ -8428,7 +8836,7 @@
           <a:p>
             <a:r>
               <a:rPr lang="en-US" dirty="0"/>
-              <a:t>No data dictionary</a:t>
+              <a:t>No data dictionary or metadata</a:t>
             </a:r>
           </a:p>
           <a:p>
@@ -8436,6 +8844,29 @@
               <a:rPr lang="en-US" dirty="0"/>
               <a:t>Ambiguous or incomplete data was excluded from analysis (No Assumptions!)</a:t>
             </a:r>
+          </a:p>
+          <a:p>
+            <a:r>
+              <a:rPr lang="en-US" dirty="0"/>
+              <a:t>No data prior to 2011 </a:t>
+            </a:r>
+          </a:p>
+          <a:p>
+            <a:pPr lvl="1"/>
+            <a:r>
+              <a:rPr lang="en-US" dirty="0"/>
+              <a:t>Historical trends</a:t>
+            </a:r>
+          </a:p>
+          <a:p>
+            <a:pPr lvl="1"/>
+            <a:r>
+              <a:rPr lang="en-US" dirty="0"/>
+              <a:t>Impacts of the construction of new stations</a:t>
+            </a:r>
+          </a:p>
+          <a:p>
+            <a:endParaRPr lang="en-US" dirty="0"/>
           </a:p>
           <a:p>
             <a:endParaRPr lang="en-US" dirty="0"/>
@@ -8455,7 +8886,7 @@
 </p:sld>
 </file>
 
-<file path=ppt/slides/slide7.xml><?xml version="1.0" encoding="utf-8"?>
+<file path=ppt/slides/slide8.xml><?xml version="1.0" encoding="utf-8"?>
 <p:sld xmlns:a="http://schemas.openxmlformats.org/drawingml/2006/main" xmlns:r="http://schemas.openxmlformats.org/officeDocument/2006/relationships" xmlns:p="http://schemas.openxmlformats.org/presentationml/2006/main">
   <p:cSld>
     <p:spTree>
@@ -8606,7 +9037,7 @@
 </p:sld>
 </file>
 
-<file path=ppt/slides/slide8.xml><?xml version="1.0" encoding="utf-8"?>
+<file path=ppt/slides/slide9.xml><?xml version="1.0" encoding="utf-8"?>
 <p:sld xmlns:a="http://schemas.openxmlformats.org/drawingml/2006/main" xmlns:r="http://schemas.openxmlformats.org/officeDocument/2006/relationships" xmlns:p="http://schemas.openxmlformats.org/presentationml/2006/main">
   <p:cSld>
     <p:spTree>
@@ -8801,133 +9232,6 @@
     <p:extLst>
       <p:ext uri="{BB962C8B-B14F-4D97-AF65-F5344CB8AC3E}">
         <p14:creationId xmlns:p14="http://schemas.microsoft.com/office/powerpoint/2010/main" val="1376009657"/>
-      </p:ext>
-    </p:extLst>
-  </p:cSld>
-  <p:clrMapOvr>
-    <a:masterClrMapping/>
-  </p:clrMapOvr>
-</p:sld>
-</file>
-
-<file path=ppt/slides/slide9.xml><?xml version="1.0" encoding="utf-8"?>
-<p:sld xmlns:a="http://schemas.openxmlformats.org/drawingml/2006/main" xmlns:r="http://schemas.openxmlformats.org/officeDocument/2006/relationships" xmlns:p="http://schemas.openxmlformats.org/presentationml/2006/main">
-  <p:cSld>
-    <p:spTree>
-      <p:nvGrpSpPr>
-        <p:cNvPr id="1" name=""/>
-        <p:cNvGrpSpPr/>
-        <p:nvPr/>
-      </p:nvGrpSpPr>
-      <p:grpSpPr>
-        <a:xfrm>
-          <a:off x="0" y="0"/>
-          <a:ext cx="0" cy="0"/>
-          <a:chOff x="0" y="0"/>
-          <a:chExt cx="0" cy="0"/>
-        </a:xfrm>
-      </p:grpSpPr>
-      <p:sp>
-        <p:nvSpPr>
-          <p:cNvPr id="2" name="Title 1">
-            <a:extLst>
-              <a:ext uri="{FF2B5EF4-FFF2-40B4-BE49-F238E27FC236}">
-                <a16:creationId xmlns:a16="http://schemas.microsoft.com/office/drawing/2014/main" id="{8697AD0D-7CB4-4EB2-AB85-565C07FB0E0B}"/>
-              </a:ext>
-            </a:extLst>
-          </p:cNvPr>
-          <p:cNvSpPr>
-            <a:spLocks noGrp="1"/>
-          </p:cNvSpPr>
-          <p:nvPr>
-            <p:ph type="title"/>
-          </p:nvPr>
-        </p:nvSpPr>
-        <p:spPr/>
-        <p:txBody>
-          <a:bodyPr/>
-          <a:lstStyle/>
-          <a:p>
-            <a:r>
-              <a:rPr lang="en-US" dirty="0"/>
-              <a:t>Telling the Story</a:t>
-            </a:r>
-          </a:p>
-        </p:txBody>
-      </p:sp>
-      <p:sp>
-        <p:nvSpPr>
-          <p:cNvPr id="4" name="Content Placeholder 2">
-            <a:extLst>
-              <a:ext uri="{FF2B5EF4-FFF2-40B4-BE49-F238E27FC236}">
-                <a16:creationId xmlns:a16="http://schemas.microsoft.com/office/drawing/2014/main" id="{7AE6D5EE-88CC-4A5B-8D4A-73BE2E3576F2}"/>
-              </a:ext>
-            </a:extLst>
-          </p:cNvPr>
-          <p:cNvSpPr>
-            <a:spLocks noGrp="1"/>
-          </p:cNvSpPr>
-          <p:nvPr>
-            <p:ph idx="1"/>
-          </p:nvPr>
-        </p:nvSpPr>
-        <p:spPr>
-          <a:xfrm>
-            <a:off x="677334" y="1464859"/>
-            <a:ext cx="8596668" cy="3880773"/>
-          </a:xfrm>
-        </p:spPr>
-        <p:txBody>
-          <a:bodyPr/>
-          <a:lstStyle/>
-          <a:p>
-            <a:r>
-              <a:rPr lang="en-US" dirty="0"/>
-              <a:t>Types of Responses</a:t>
-            </a:r>
-          </a:p>
-        </p:txBody>
-      </p:sp>
-      <p:pic>
-        <p:nvPicPr>
-          <p:cNvPr id="10" name="Picture 9">
-            <a:extLst>
-              <a:ext uri="{FF2B5EF4-FFF2-40B4-BE49-F238E27FC236}">
-                <a16:creationId xmlns:a16="http://schemas.microsoft.com/office/drawing/2014/main" id="{C14FF669-EF75-47CF-ACC8-7AA656377B14}"/>
-              </a:ext>
-            </a:extLst>
-          </p:cNvPr>
-          <p:cNvPicPr>
-            <a:picLocks noChangeAspect="1"/>
-          </p:cNvPicPr>
-          <p:nvPr/>
-        </p:nvPicPr>
-        <p:blipFill>
-          <a:blip r:embed="rId2">
-            <a:extLst>
-              <a:ext uri="{28A0092B-C50C-407E-A947-70E740481C1C}">
-                <a14:useLocalDpi xmlns:a14="http://schemas.microsoft.com/office/drawing/2010/main" val="0"/>
-              </a:ext>
-            </a:extLst>
-          </a:blip>
-          <a:stretch>
-            <a:fillRect/>
-          </a:stretch>
-        </p:blipFill>
-        <p:spPr>
-          <a:xfrm>
-            <a:off x="3335503" y="1704974"/>
-            <a:ext cx="5520995" cy="5000625"/>
-          </a:xfrm>
-          <a:prstGeom prst="rect">
-            <a:avLst/>
-          </a:prstGeom>
-        </p:spPr>
-      </p:pic>
-    </p:spTree>
-    <p:extLst>
-      <p:ext uri="{BB962C8B-B14F-4D97-AF65-F5344CB8AC3E}">
-        <p14:creationId xmlns:p14="http://schemas.microsoft.com/office/powerpoint/2010/main" val="796665630"/>
       </p:ext>
     </p:extLst>
   </p:cSld>

</xml_diff>